<commit_message>
Add more to presentation; Add route displayer; Add tests;
</commit_message>
<xml_diff>
--- a/docs/BarcanVirgil.pptx
+++ b/docs/BarcanVirgil.pptx
@@ -1,6 +1,6 @@
 
 <file path=ppt/presentation.xml><?xml version="1.0" encoding="utf-8"?>
-<p:presentation xmlns:a="http://schemas.openxmlformats.org/drawingml/2006/main" xmlns:r="http://schemas.openxmlformats.org/officeDocument/2006/relationships" xmlns:p="http://schemas.openxmlformats.org/presentationml/2006/main" autoCompressPictures="0">
+<p:presentation xmlns:a="http://schemas.openxmlformats.org/drawingml/2006/main" xmlns:r="http://schemas.openxmlformats.org/officeDocument/2006/relationships" xmlns:p="http://schemas.openxmlformats.org/presentationml/2006/main" showSpecialPlsOnTitleSld="0" autoCompressPictures="0">
   <p:sldMasterIdLst>
     <p:sldMasterId id="2147483686" r:id="rId1"/>
   </p:sldMasterIdLst>
@@ -131,7 +131,7 @@
   </p:defaultTextStyle>
   <p:extLst>
     <p:ext uri="{EFAFB233-063F-42B5-8137-9DF3F51BA10A}">
-      <p15:sldGuideLst xmlns="" xmlns:p15="http://schemas.microsoft.com/office/powerpoint/2012/main"/>
+      <p15:sldGuideLst xmlns:p15="http://schemas.microsoft.com/office/powerpoint/2012/main" xmlns=""/>
     </p:ext>
   </p:extLst>
 </p:presentation>
@@ -220,7 +220,7 @@
             <a:fld id="{9D0E06F7-561D-49D3-8C01-AA1CFE09A384}" type="datetimeFigureOut">
               <a:rPr lang="en-US"/>
               <a:pPr/>
-              <a:t>6/26/2016</a:t>
+              <a:t>6/27/2016</a:t>
             </a:fld>
             <a:endParaRPr lang="ro-RO"/>
           </a:p>
@@ -388,7 +388,7 @@
     </p:spTree>
     <p:extLst>
       <p:ext uri="{BB962C8B-B14F-4D97-AF65-F5344CB8AC3E}">
-        <p14:creationId xmlns="" xmlns:p14="http://schemas.microsoft.com/office/powerpoint/2010/main" val="214415985"/>
+        <p14:creationId xmlns:p14="http://schemas.microsoft.com/office/powerpoint/2010/main" xmlns="" val="214415985"/>
       </p:ext>
     </p:extLst>
   </p:cSld>
@@ -577,7 +577,7 @@
     </p:spTree>
     <p:extLst>
       <p:ext uri="{BB962C8B-B14F-4D97-AF65-F5344CB8AC3E}">
-        <p14:creationId xmlns="" xmlns:p14="http://schemas.microsoft.com/office/powerpoint/2010/main" val="2475368386"/>
+        <p14:creationId xmlns:p14="http://schemas.microsoft.com/office/powerpoint/2010/main" xmlns="" val="2475368386"/>
       </p:ext>
     </p:extLst>
   </p:cSld>
@@ -1199,7 +1199,20 @@
             </a:r>
             <a:r>
               <a:rPr lang="ro-RO" baseline="0" dirty="0" smtClean="0"/>
-              <a:t> k este definita ca raportul dintre distanta reala parcursa de utilizator si distanta estimata de algoritm. Aceasta valoare se afla printr-o procedura de calibrare.</a:t>
+              <a:t> k este definita ca raportul dintre distanta reala parcursa de utilizator si distanta estimata de algoritm. Aceasta valoare se afla printr-o procedura de calibrare</a:t>
+            </a:r>
+            <a:r>
+              <a:rPr lang="ro-RO" baseline="0" dirty="0" smtClean="0"/>
+              <a:t>.</a:t>
+            </a:r>
+          </a:p>
+          <a:p>
+            <a:endParaRPr lang="en-GB" baseline="0" smtClean="0"/>
+          </a:p>
+          <a:p>
+            <a:r>
+              <a:rPr lang="en-GB" baseline="0" smtClean="0"/>
+              <a:t>Lungimea unui pas i este </a:t>
             </a:r>
             <a:endParaRPr lang="en-GB" dirty="0"/>
           </a:p>
@@ -1699,9 +1712,389 @@
           <a:p>
             <a:r>
               <a:rPr lang="ro-RO" baseline="0" dirty="0" smtClean="0"/>
-              <a:t>Daca algoritmul ofera pozitii bune/mai bune ca GPS-ul, atunci putem considera ca implementarea si-a atins scopul, acela de a oferi un sistem de navigatie mai bun.</a:t>
-            </a:r>
-            <a:endParaRPr lang="en-GB" dirty="0"/>
+              <a:t>Daca algoritmul ofera pozitii bune/mai bune ca GPS-ul, atunci putem considera ca implementarea si-a atins scopul, acela de a oferi un sistem de navigatie mai bun</a:t>
+            </a:r>
+            <a:r>
+              <a:rPr lang="ro-RO" baseline="0" dirty="0" smtClean="0"/>
+              <a:t>.</a:t>
+            </a:r>
+            <a:endParaRPr lang="en-GB" baseline="0" dirty="0" smtClean="0"/>
+          </a:p>
+          <a:p>
+            <a:r>
+              <a:rPr lang="en-GB" baseline="0" dirty="0" smtClean="0"/>
+              <a:t>Se </a:t>
+            </a:r>
+            <a:r>
+              <a:rPr lang="en-GB" baseline="0" dirty="0" err="1" smtClean="0"/>
+              <a:t>observa</a:t>
+            </a:r>
+            <a:r>
+              <a:rPr lang="en-GB" baseline="0" dirty="0" smtClean="0"/>
+              <a:t> din </a:t>
+            </a:r>
+            <a:r>
+              <a:rPr lang="en-GB" baseline="0" dirty="0" err="1" smtClean="0"/>
+              <a:t>cele</a:t>
+            </a:r>
+            <a:r>
+              <a:rPr lang="en-GB" baseline="0" dirty="0" smtClean="0"/>
+              <a:t> 2 </a:t>
+            </a:r>
+            <a:r>
+              <a:rPr lang="en-GB" baseline="0" dirty="0" err="1" smtClean="0"/>
+              <a:t>imagini</a:t>
+            </a:r>
+            <a:r>
+              <a:rPr lang="en-GB" baseline="0" dirty="0" smtClean="0"/>
+              <a:t> ca </a:t>
+            </a:r>
+            <a:r>
+              <a:rPr lang="en-GB" baseline="0" dirty="0" err="1" smtClean="0"/>
+              <a:t>algoritmul</a:t>
+            </a:r>
+            <a:r>
+              <a:rPr lang="en-GB" baseline="0" dirty="0" smtClean="0"/>
+              <a:t> </a:t>
+            </a:r>
+            <a:r>
+              <a:rPr lang="en-GB" baseline="0" dirty="0" err="1" smtClean="0"/>
+              <a:t>oferit</a:t>
+            </a:r>
+            <a:r>
+              <a:rPr lang="en-GB" baseline="0" dirty="0" smtClean="0"/>
+              <a:t> de </a:t>
+            </a:r>
+            <a:r>
+              <a:rPr lang="en-GB" baseline="0" dirty="0" err="1" smtClean="0"/>
+              <a:t>noi</a:t>
+            </a:r>
+            <a:r>
+              <a:rPr lang="en-GB" baseline="0" dirty="0" smtClean="0"/>
+              <a:t> </a:t>
+            </a:r>
+            <a:r>
+              <a:rPr lang="en-GB" baseline="0" dirty="0" err="1" smtClean="0"/>
+              <a:t>este</a:t>
+            </a:r>
+            <a:r>
+              <a:rPr lang="en-GB" baseline="0" dirty="0" smtClean="0"/>
+              <a:t> </a:t>
+            </a:r>
+            <a:r>
+              <a:rPr lang="en-GB" baseline="0" dirty="0" err="1" smtClean="0"/>
+              <a:t>mai</a:t>
+            </a:r>
+            <a:r>
+              <a:rPr lang="en-GB" baseline="0" dirty="0" smtClean="0"/>
+              <a:t> </a:t>
+            </a:r>
+            <a:r>
+              <a:rPr lang="en-GB" baseline="0" dirty="0" err="1" smtClean="0"/>
+              <a:t>eficient</a:t>
+            </a:r>
+            <a:r>
+              <a:rPr lang="en-GB" baseline="0" dirty="0" smtClean="0"/>
+              <a:t> in </a:t>
+            </a:r>
+            <a:r>
+              <a:rPr lang="en-GB" baseline="0" dirty="0" err="1" smtClean="0"/>
+              <a:t>linie</a:t>
+            </a:r>
+            <a:r>
+              <a:rPr lang="en-GB" baseline="0" dirty="0" smtClean="0"/>
+              <a:t> </a:t>
+            </a:r>
+            <a:r>
+              <a:rPr lang="en-GB" baseline="0" dirty="0" err="1" smtClean="0"/>
+              <a:t>dreapta</a:t>
+            </a:r>
+            <a:r>
+              <a:rPr lang="en-GB" baseline="0" dirty="0" smtClean="0"/>
+              <a:t>, </a:t>
+            </a:r>
+            <a:r>
+              <a:rPr lang="en-GB" baseline="0" dirty="0" err="1" smtClean="0"/>
+              <a:t>avand</a:t>
+            </a:r>
+            <a:r>
+              <a:rPr lang="en-GB" baseline="0" dirty="0" smtClean="0"/>
+              <a:t> o </a:t>
+            </a:r>
+            <a:r>
+              <a:rPr lang="en-GB" baseline="0" dirty="0" err="1" smtClean="0"/>
+              <a:t>eroare</a:t>
+            </a:r>
+            <a:r>
+              <a:rPr lang="en-GB" baseline="0" dirty="0" smtClean="0"/>
+              <a:t> mica, </a:t>
+            </a:r>
+            <a:r>
+              <a:rPr lang="en-GB" baseline="0" dirty="0" err="1" smtClean="0"/>
+              <a:t>pe</a:t>
+            </a:r>
+            <a:r>
+              <a:rPr lang="en-GB" baseline="0" dirty="0" smtClean="0"/>
+              <a:t> </a:t>
+            </a:r>
+            <a:r>
+              <a:rPr lang="en-GB" baseline="0" dirty="0" err="1" smtClean="0"/>
+              <a:t>cazul</a:t>
+            </a:r>
+            <a:r>
+              <a:rPr lang="en-GB" baseline="0" dirty="0" smtClean="0"/>
+              <a:t> din imagine, de </a:t>
+            </a:r>
+            <a:r>
+              <a:rPr lang="en-GB" baseline="0" dirty="0" err="1" smtClean="0"/>
+              <a:t>doar</a:t>
+            </a:r>
+            <a:r>
+              <a:rPr lang="en-GB" baseline="0" dirty="0" smtClean="0"/>
+              <a:t> 2 </a:t>
+            </a:r>
+            <a:r>
+              <a:rPr lang="en-GB" baseline="0" dirty="0" err="1" smtClean="0"/>
+              <a:t>metri</a:t>
+            </a:r>
+            <a:r>
+              <a:rPr lang="en-GB" baseline="0" dirty="0" smtClean="0"/>
+              <a:t>.</a:t>
+            </a:r>
+          </a:p>
+          <a:p>
+            <a:r>
+              <a:rPr lang="en-GB" baseline="0" dirty="0" err="1" smtClean="0"/>
+              <a:t>Pe</a:t>
+            </a:r>
+            <a:r>
+              <a:rPr lang="en-GB" baseline="0" dirty="0" smtClean="0"/>
+              <a:t> </a:t>
+            </a:r>
+            <a:r>
+              <a:rPr lang="en-GB" baseline="0" dirty="0" err="1" smtClean="0"/>
+              <a:t>cazul</a:t>
+            </a:r>
+            <a:r>
+              <a:rPr lang="en-GB" baseline="0" dirty="0" smtClean="0"/>
+              <a:t> </a:t>
+            </a:r>
+            <a:r>
+              <a:rPr lang="en-GB" baseline="0" dirty="0" err="1" smtClean="0"/>
+              <a:t>dreptunghiular</a:t>
+            </a:r>
+            <a:r>
+              <a:rPr lang="en-GB" baseline="0" dirty="0" smtClean="0"/>
+              <a:t>, </a:t>
+            </a:r>
+            <a:r>
+              <a:rPr lang="en-GB" baseline="0" dirty="0" err="1" smtClean="0"/>
+              <a:t>algoritmul</a:t>
+            </a:r>
+            <a:r>
+              <a:rPr lang="en-GB" baseline="0" dirty="0" smtClean="0"/>
+              <a:t> </a:t>
+            </a:r>
+            <a:r>
+              <a:rPr lang="en-GB" baseline="0" dirty="0" err="1" smtClean="0"/>
+              <a:t>da</a:t>
+            </a:r>
+            <a:r>
+              <a:rPr lang="en-GB" baseline="0" dirty="0" smtClean="0"/>
+              <a:t> </a:t>
+            </a:r>
+            <a:r>
+              <a:rPr lang="en-GB" baseline="0" dirty="0" err="1" smtClean="0"/>
+              <a:t>erori</a:t>
+            </a:r>
+            <a:r>
+              <a:rPr lang="en-GB" baseline="0" dirty="0" smtClean="0"/>
+              <a:t> </a:t>
+            </a:r>
+            <a:r>
+              <a:rPr lang="en-GB" baseline="0" dirty="0" err="1" smtClean="0"/>
+              <a:t>mai</a:t>
+            </a:r>
+            <a:r>
+              <a:rPr lang="en-GB" baseline="0" dirty="0" smtClean="0"/>
+              <a:t> </a:t>
+            </a:r>
+            <a:r>
+              <a:rPr lang="en-GB" baseline="0" dirty="0" err="1" smtClean="0"/>
+              <a:t>mari</a:t>
+            </a:r>
+            <a:r>
+              <a:rPr lang="en-GB" baseline="0" dirty="0" smtClean="0"/>
+              <a:t>, </a:t>
+            </a:r>
+            <a:r>
+              <a:rPr lang="en-GB" baseline="0" dirty="0" err="1" smtClean="0"/>
+              <a:t>insa</a:t>
+            </a:r>
+            <a:r>
+              <a:rPr lang="en-GB" baseline="0" dirty="0" smtClean="0"/>
+              <a:t> </a:t>
+            </a:r>
+            <a:r>
+              <a:rPr lang="en-GB" baseline="0" dirty="0" err="1" smtClean="0"/>
+              <a:t>pozitia</a:t>
+            </a:r>
+            <a:r>
+              <a:rPr lang="en-GB" baseline="0" dirty="0" smtClean="0"/>
+              <a:t> </a:t>
+            </a:r>
+            <a:r>
+              <a:rPr lang="en-GB" baseline="0" dirty="0" err="1" smtClean="0"/>
+              <a:t>finala</a:t>
+            </a:r>
+            <a:r>
+              <a:rPr lang="en-GB" baseline="0" dirty="0" smtClean="0"/>
+              <a:t> </a:t>
+            </a:r>
+            <a:r>
+              <a:rPr lang="en-GB" baseline="0" dirty="0" err="1" smtClean="0"/>
+              <a:t>este</a:t>
+            </a:r>
+            <a:r>
+              <a:rPr lang="en-GB" baseline="0" dirty="0" smtClean="0"/>
+              <a:t> la </a:t>
+            </a:r>
+            <a:r>
+              <a:rPr lang="en-GB" baseline="0" dirty="0" err="1" smtClean="0"/>
+              <a:t>distanta</a:t>
+            </a:r>
+            <a:r>
+              <a:rPr lang="en-GB" baseline="0" dirty="0" smtClean="0"/>
+              <a:t> de 10 </a:t>
+            </a:r>
+            <a:r>
+              <a:rPr lang="en-GB" baseline="0" dirty="0" err="1" smtClean="0"/>
+              <a:t>metri</a:t>
+            </a:r>
+            <a:r>
+              <a:rPr lang="en-GB" baseline="0" dirty="0" smtClean="0"/>
+              <a:t> de </a:t>
+            </a:r>
+            <a:r>
+              <a:rPr lang="en-GB" baseline="0" dirty="0" err="1" smtClean="0"/>
+              <a:t>cea</a:t>
+            </a:r>
+            <a:r>
+              <a:rPr lang="en-GB" baseline="0" dirty="0" smtClean="0"/>
+              <a:t> </a:t>
+            </a:r>
+            <a:r>
+              <a:rPr lang="en-GB" baseline="0" dirty="0" err="1" smtClean="0"/>
+              <a:t>reala</a:t>
+            </a:r>
+            <a:r>
+              <a:rPr lang="en-GB" baseline="0" dirty="0" smtClean="0"/>
+              <a:t>, </a:t>
+            </a:r>
+            <a:r>
+              <a:rPr lang="en-GB" baseline="0" dirty="0" err="1" smtClean="0"/>
+              <a:t>ceea</a:t>
+            </a:r>
+            <a:r>
+              <a:rPr lang="en-GB" baseline="0" dirty="0" smtClean="0"/>
+              <a:t> </a:t>
+            </a:r>
+            <a:r>
+              <a:rPr lang="en-GB" baseline="0" dirty="0" err="1" smtClean="0"/>
+              <a:t>ce</a:t>
+            </a:r>
+            <a:r>
+              <a:rPr lang="en-GB" baseline="0" dirty="0" smtClean="0"/>
+              <a:t> </a:t>
+            </a:r>
+            <a:r>
+              <a:rPr lang="en-GB" baseline="0" dirty="0" err="1" smtClean="0"/>
+              <a:t>inseamna</a:t>
+            </a:r>
+            <a:r>
+              <a:rPr lang="en-GB" baseline="0" dirty="0" smtClean="0"/>
+              <a:t> o </a:t>
+            </a:r>
+            <a:r>
+              <a:rPr lang="en-GB" baseline="0" dirty="0" err="1" smtClean="0"/>
+              <a:t>eroare</a:t>
+            </a:r>
+            <a:r>
+              <a:rPr lang="en-GB" baseline="0" dirty="0" smtClean="0"/>
+              <a:t> de 5% </a:t>
+            </a:r>
+            <a:r>
+              <a:rPr lang="en-GB" baseline="0" dirty="0" err="1" smtClean="0"/>
+              <a:t>pentru</a:t>
+            </a:r>
+            <a:r>
+              <a:rPr lang="en-GB" baseline="0" dirty="0" smtClean="0"/>
+              <a:t> </a:t>
+            </a:r>
+            <a:r>
+              <a:rPr lang="en-GB" baseline="0" dirty="0" err="1" smtClean="0"/>
+              <a:t>cazul</a:t>
+            </a:r>
+            <a:r>
+              <a:rPr lang="en-GB" baseline="0" dirty="0" smtClean="0"/>
+              <a:t> </a:t>
+            </a:r>
+            <a:r>
+              <a:rPr lang="en-GB" baseline="0" dirty="0" err="1" smtClean="0"/>
+              <a:t>prezentat</a:t>
+            </a:r>
+            <a:r>
+              <a:rPr lang="en-GB" baseline="0" dirty="0" smtClean="0"/>
+              <a:t>. </a:t>
+            </a:r>
+            <a:r>
+              <a:rPr lang="en-GB" baseline="0" dirty="0" err="1" smtClean="0"/>
+              <a:t>Exista</a:t>
+            </a:r>
+            <a:r>
+              <a:rPr lang="en-GB" baseline="0" dirty="0" smtClean="0"/>
+              <a:t> </a:t>
+            </a:r>
+            <a:r>
+              <a:rPr lang="en-GB" baseline="0" dirty="0" err="1" smtClean="0"/>
+              <a:t>totusi</a:t>
+            </a:r>
+            <a:r>
+              <a:rPr lang="en-GB" baseline="0" dirty="0" smtClean="0"/>
+              <a:t> </a:t>
+            </a:r>
+            <a:r>
+              <a:rPr lang="en-GB" baseline="0" dirty="0" err="1" smtClean="0"/>
+              <a:t>si</a:t>
+            </a:r>
+            <a:r>
+              <a:rPr lang="en-GB" baseline="0" dirty="0" smtClean="0"/>
+              <a:t> </a:t>
+            </a:r>
+            <a:r>
+              <a:rPr lang="en-GB" baseline="0" dirty="0" err="1" smtClean="0"/>
+              <a:t>cazuri</a:t>
+            </a:r>
+            <a:r>
+              <a:rPr lang="en-GB" baseline="0" dirty="0" smtClean="0"/>
+              <a:t> </a:t>
+            </a:r>
+            <a:r>
+              <a:rPr lang="en-GB" baseline="0" dirty="0" err="1" smtClean="0"/>
+              <a:t>mai</a:t>
+            </a:r>
+            <a:r>
+              <a:rPr lang="en-GB" baseline="0" dirty="0" smtClean="0"/>
+              <a:t> </a:t>
+            </a:r>
+            <a:r>
+              <a:rPr lang="en-GB" baseline="0" dirty="0" err="1" smtClean="0"/>
+              <a:t>rele</a:t>
+            </a:r>
+            <a:r>
+              <a:rPr lang="en-GB" baseline="0" dirty="0" smtClean="0"/>
+              <a:t>.</a:t>
+            </a:r>
           </a:p>
         </p:txBody>
       </p:sp>
@@ -2518,11 +2911,7 @@
             </a:pPr>
             <a:r>
               <a:rPr lang="ro-RO" baseline="0" dirty="0" smtClean="0"/>
-              <a:t>Bob doreste sa ajunga la Alice, iar pentru asta are nevoie de navigatie</a:t>
-            </a:r>
-            <a:r>
-              <a:rPr lang="ro-RO" baseline="0" dirty="0" smtClean="0"/>
-              <a:t>.</a:t>
+              <a:t>Bob doreste sa ajunga la Alice, iar pentru asta are nevoie de navigatie.</a:t>
             </a:r>
             <a:endParaRPr lang="en-GB" baseline="0" dirty="0" smtClean="0"/>
           </a:p>
@@ -3502,10 +3891,9 @@
           <a:bodyPr/>
           <a:lstStyle/>
           <a:p>
-            <a:fld id="{B61BEF0D-F0BB-DE4B-95CE-6DB70DBA9567}" type="datetimeFigureOut">
-              <a:rPr lang="en-US" dirty="0"/>
-              <a:pPr/>
-              <a:t>6/26/2016</a:t>
+            <a:fld id="{57550951-75CE-47F5-AB06-E3DE3F02AA3E}" type="datetime1">
+              <a:rPr lang="en-US" smtClean="0"/>
+              <a:t>6/27/2016</a:t>
             </a:fld>
             <a:endParaRPr lang="en-US" dirty="0"/>
           </a:p>
@@ -3562,7 +3950,7 @@
     </p:spTree>
     <p:extLst>
       <p:ext uri="{BB962C8B-B14F-4D97-AF65-F5344CB8AC3E}">
-        <p14:creationId xmlns="" xmlns:p14="http://schemas.microsoft.com/office/powerpoint/2010/main" val="4247021823"/>
+        <p14:creationId xmlns:p14="http://schemas.microsoft.com/office/powerpoint/2010/main" xmlns="" val="4247021823"/>
       </p:ext>
     </p:extLst>
   </p:cSld>
@@ -3800,10 +4188,9 @@
           <a:bodyPr/>
           <a:lstStyle/>
           <a:p>
-            <a:fld id="{B61BEF0D-F0BB-DE4B-95CE-6DB70DBA9567}" type="datetimeFigureOut">
-              <a:rPr lang="en-US" dirty="0"/>
-              <a:pPr/>
-              <a:t>6/26/2016</a:t>
+            <a:fld id="{0D5348DE-DE51-404E-82D7-1CC6A83E1B79}" type="datetime1">
+              <a:rPr lang="en-US" smtClean="0"/>
+              <a:t>6/27/2016</a:t>
             </a:fld>
             <a:endParaRPr lang="en-US" dirty="0"/>
           </a:p>
@@ -3855,7 +4242,7 @@
     </p:spTree>
     <p:extLst>
       <p:ext uri="{BB962C8B-B14F-4D97-AF65-F5344CB8AC3E}">
-        <p14:creationId xmlns="" xmlns:p14="http://schemas.microsoft.com/office/powerpoint/2010/main" val="391396127"/>
+        <p14:creationId xmlns:p14="http://schemas.microsoft.com/office/powerpoint/2010/main" xmlns="" val="391396127"/>
       </p:ext>
     </p:extLst>
   </p:cSld>
@@ -4050,10 +4437,9 @@
           <a:bodyPr/>
           <a:lstStyle/>
           <a:p>
-            <a:fld id="{B61BEF0D-F0BB-DE4B-95CE-6DB70DBA9567}" type="datetimeFigureOut">
-              <a:rPr lang="en-US" dirty="0"/>
-              <a:pPr/>
-              <a:t>6/26/2016</a:t>
+            <a:fld id="{B1097F98-3B17-41F9-B468-51066EFB9D50}" type="datetime1">
+              <a:rPr lang="en-US" smtClean="0"/>
+              <a:t>6/27/2016</a:t>
             </a:fld>
             <a:endParaRPr lang="en-US" dirty="0"/>
           </a:p>
@@ -4105,7 +4491,7 @@
     </p:spTree>
     <p:extLst>
       <p:ext uri="{BB962C8B-B14F-4D97-AF65-F5344CB8AC3E}">
-        <p14:creationId xmlns="" xmlns:p14="http://schemas.microsoft.com/office/powerpoint/2010/main" val="2905058716"/>
+        <p14:creationId xmlns:p14="http://schemas.microsoft.com/office/powerpoint/2010/main" xmlns="" val="2905058716"/>
       </p:ext>
     </p:extLst>
   </p:cSld>
@@ -4592,10 +4978,9 @@
           <a:bodyPr/>
           <a:lstStyle/>
           <a:p>
-            <a:fld id="{B61BEF0D-F0BB-DE4B-95CE-6DB70DBA9567}" type="datetimeFigureOut">
-              <a:rPr lang="en-US" dirty="0"/>
-              <a:pPr/>
-              <a:t>6/26/2016</a:t>
+            <a:fld id="{2849C48F-F42D-43B8-A247-68A166B70294}" type="datetime1">
+              <a:rPr lang="en-US" smtClean="0"/>
+              <a:t>6/27/2016</a:t>
             </a:fld>
             <a:endParaRPr lang="en-US" dirty="0"/>
           </a:p>
@@ -4647,7 +5032,7 @@
     </p:spTree>
     <p:extLst>
       <p:ext uri="{BB962C8B-B14F-4D97-AF65-F5344CB8AC3E}">
-        <p14:creationId xmlns="" xmlns:p14="http://schemas.microsoft.com/office/powerpoint/2010/main" val="3528983322"/>
+        <p14:creationId xmlns:p14="http://schemas.microsoft.com/office/powerpoint/2010/main" xmlns="" val="3528983322"/>
       </p:ext>
     </p:extLst>
   </p:cSld>
@@ -4842,10 +5227,9 @@
           <a:bodyPr/>
           <a:lstStyle/>
           <a:p>
-            <a:fld id="{B61BEF0D-F0BB-DE4B-95CE-6DB70DBA9567}" type="datetimeFigureOut">
-              <a:rPr lang="en-US" dirty="0"/>
-              <a:pPr/>
-              <a:t>6/26/2016</a:t>
+            <a:fld id="{1275A433-FAAA-478C-BF12-CE9ACE5F0229}" type="datetime1">
+              <a:rPr lang="en-US" smtClean="0"/>
+              <a:t>6/27/2016</a:t>
             </a:fld>
             <a:endParaRPr lang="en-US" dirty="0"/>
           </a:p>
@@ -4897,7 +5281,7 @@
     </p:spTree>
     <p:extLst>
       <p:ext uri="{BB962C8B-B14F-4D97-AF65-F5344CB8AC3E}">
-        <p14:creationId xmlns="" xmlns:p14="http://schemas.microsoft.com/office/powerpoint/2010/main" val="1069519673"/>
+        <p14:creationId xmlns:p14="http://schemas.microsoft.com/office/powerpoint/2010/main" xmlns="" val="1069519673"/>
       </p:ext>
     </p:extLst>
   </p:cSld>
@@ -5376,10 +5760,9 @@
           <a:bodyPr/>
           <a:lstStyle/>
           <a:p>
-            <a:fld id="{B61BEF0D-F0BB-DE4B-95CE-6DB70DBA9567}" type="datetimeFigureOut">
-              <a:rPr lang="en-US" dirty="0"/>
-              <a:pPr/>
-              <a:t>6/26/2016</a:t>
+            <a:fld id="{EDA969CC-88C6-4E8B-898E-B2FF4AD6E668}" type="datetime1">
+              <a:rPr lang="en-US" smtClean="0"/>
+              <a:t>6/27/2016</a:t>
             </a:fld>
             <a:endParaRPr lang="en-US" dirty="0"/>
           </a:p>
@@ -5431,7 +5814,7 @@
     </p:spTree>
     <p:extLst>
       <p:ext uri="{BB962C8B-B14F-4D97-AF65-F5344CB8AC3E}">
-        <p14:creationId xmlns="" xmlns:p14="http://schemas.microsoft.com/office/powerpoint/2010/main" val="4177502009"/>
+        <p14:creationId xmlns:p14="http://schemas.microsoft.com/office/powerpoint/2010/main" xmlns="" val="4177502009"/>
       </p:ext>
     </p:extLst>
   </p:cSld>
@@ -5675,10 +6058,9 @@
           <a:bodyPr/>
           <a:lstStyle/>
           <a:p>
-            <a:fld id="{B61BEF0D-F0BB-DE4B-95CE-6DB70DBA9567}" type="datetimeFigureOut">
-              <a:rPr lang="en-US" dirty="0"/>
-              <a:pPr/>
-              <a:t>6/26/2016</a:t>
+            <a:fld id="{951000BF-D822-479B-AF2D-450EFCEB11A7}" type="datetime1">
+              <a:rPr lang="en-US" smtClean="0"/>
+              <a:t>6/27/2016</a:t>
             </a:fld>
             <a:endParaRPr lang="en-US" dirty="0"/>
           </a:p>
@@ -5730,7 +6112,7 @@
     </p:spTree>
     <p:extLst>
       <p:ext uri="{BB962C8B-B14F-4D97-AF65-F5344CB8AC3E}">
-        <p14:creationId xmlns="" xmlns:p14="http://schemas.microsoft.com/office/powerpoint/2010/main" val="4189134668"/>
+        <p14:creationId xmlns:p14="http://schemas.microsoft.com/office/powerpoint/2010/main" xmlns="" val="4189134668"/>
       </p:ext>
     </p:extLst>
   </p:cSld>
@@ -5851,10 +6233,9 @@
           <a:bodyPr/>
           <a:lstStyle/>
           <a:p>
-            <a:fld id="{B61BEF0D-F0BB-DE4B-95CE-6DB70DBA9567}" type="datetimeFigureOut">
-              <a:rPr lang="en-US" dirty="0"/>
-              <a:pPr/>
-              <a:t>6/26/2016</a:t>
+            <a:fld id="{8762479E-6FC7-4BB0-9880-3C96488898A8}" type="datetime1">
+              <a:rPr lang="en-US" smtClean="0"/>
+              <a:t>6/27/2016</a:t>
             </a:fld>
             <a:endParaRPr lang="en-US" dirty="0"/>
           </a:p>
@@ -5906,7 +6287,7 @@
     </p:spTree>
     <p:extLst>
       <p:ext uri="{BB962C8B-B14F-4D97-AF65-F5344CB8AC3E}">
-        <p14:creationId xmlns="" xmlns:p14="http://schemas.microsoft.com/office/powerpoint/2010/main" val="4034276171"/>
+        <p14:creationId xmlns:p14="http://schemas.microsoft.com/office/powerpoint/2010/main" xmlns="" val="4034276171"/>
       </p:ext>
     </p:extLst>
   </p:cSld>
@@ -6033,10 +6414,9 @@
           <a:bodyPr/>
           <a:lstStyle/>
           <a:p>
-            <a:fld id="{B61BEF0D-F0BB-DE4B-95CE-6DB70DBA9567}" type="datetimeFigureOut">
-              <a:rPr lang="en-US" dirty="0"/>
-              <a:pPr/>
-              <a:t>6/26/2016</a:t>
+            <a:fld id="{1FBF5EC6-420D-412B-8600-823EBBE0AC14}" type="datetime1">
+              <a:rPr lang="en-US" smtClean="0"/>
+              <a:t>6/27/2016</a:t>
             </a:fld>
             <a:endParaRPr lang="en-US" dirty="0"/>
           </a:p>
@@ -6088,7 +6468,7 @@
     </p:spTree>
     <p:extLst>
       <p:ext uri="{BB962C8B-B14F-4D97-AF65-F5344CB8AC3E}">
-        <p14:creationId xmlns="" xmlns:p14="http://schemas.microsoft.com/office/powerpoint/2010/main" val="1432167685"/>
+        <p14:creationId xmlns:p14="http://schemas.microsoft.com/office/powerpoint/2010/main" xmlns="" val="1432167685"/>
       </p:ext>
     </p:extLst>
   </p:cSld>
@@ -6205,10 +6585,9 @@
           <a:bodyPr/>
           <a:lstStyle/>
           <a:p>
-            <a:fld id="{B61BEF0D-F0BB-DE4B-95CE-6DB70DBA9567}" type="datetimeFigureOut">
-              <a:rPr lang="en-US" dirty="0"/>
-              <a:pPr/>
-              <a:t>6/26/2016</a:t>
+            <a:fld id="{1E607E87-0249-4786-BDCE-23FDEC846433}" type="datetime1">
+              <a:rPr lang="en-US" smtClean="0"/>
+              <a:t>6/27/2016</a:t>
             </a:fld>
             <a:endParaRPr lang="en-US" dirty="0"/>
           </a:p>
@@ -6265,7 +6644,7 @@
     </p:spTree>
     <p:extLst>
       <p:ext uri="{BB962C8B-B14F-4D97-AF65-F5344CB8AC3E}">
-        <p14:creationId xmlns="" xmlns:p14="http://schemas.microsoft.com/office/powerpoint/2010/main" val="870778221"/>
+        <p14:creationId xmlns:p14="http://schemas.microsoft.com/office/powerpoint/2010/main" xmlns="" val="870778221"/>
       </p:ext>
     </p:extLst>
   </p:cSld>
@@ -6458,10 +6837,9 @@
           <a:bodyPr/>
           <a:lstStyle/>
           <a:p>
-            <a:fld id="{B61BEF0D-F0BB-DE4B-95CE-6DB70DBA9567}" type="datetimeFigureOut">
-              <a:rPr lang="en-US" dirty="0"/>
-              <a:pPr/>
-              <a:t>6/26/2016</a:t>
+            <a:fld id="{0D88B3D9-117A-4C52-B7BF-92B5A20ED488}" type="datetime1">
+              <a:rPr lang="en-US" smtClean="0"/>
+              <a:t>6/27/2016</a:t>
             </a:fld>
             <a:endParaRPr lang="en-US" dirty="0"/>
           </a:p>
@@ -6513,7 +6891,7 @@
     </p:spTree>
     <p:extLst>
       <p:ext uri="{BB962C8B-B14F-4D97-AF65-F5344CB8AC3E}">
-        <p14:creationId xmlns="" xmlns:p14="http://schemas.microsoft.com/office/powerpoint/2010/main" val="3232001771"/>
+        <p14:creationId xmlns:p14="http://schemas.microsoft.com/office/powerpoint/2010/main" xmlns="" val="3232001771"/>
       </p:ext>
     </p:extLst>
   </p:cSld>
@@ -6757,10 +7135,9 @@
           <a:bodyPr/>
           <a:lstStyle/>
           <a:p>
-            <a:fld id="{B61BEF0D-F0BB-DE4B-95CE-6DB70DBA9567}" type="datetimeFigureOut">
-              <a:rPr lang="en-US" dirty="0"/>
-              <a:pPr/>
-              <a:t>6/26/2016</a:t>
+            <a:fld id="{C7E3B4E3-4881-4B69-B4C4-D11930BB31DF}" type="datetime1">
+              <a:rPr lang="en-US" smtClean="0"/>
+              <a:t>6/27/2016</a:t>
             </a:fld>
             <a:endParaRPr lang="en-US" dirty="0"/>
           </a:p>
@@ -6812,7 +7189,7 @@
     </p:spTree>
     <p:extLst>
       <p:ext uri="{BB962C8B-B14F-4D97-AF65-F5344CB8AC3E}">
-        <p14:creationId xmlns="" xmlns:p14="http://schemas.microsoft.com/office/powerpoint/2010/main" val="470558787"/>
+        <p14:creationId xmlns:p14="http://schemas.microsoft.com/office/powerpoint/2010/main" xmlns="" val="470558787"/>
       </p:ext>
     </p:extLst>
   </p:cSld>
@@ -7201,10 +7578,9 @@
           <a:bodyPr/>
           <a:lstStyle/>
           <a:p>
-            <a:fld id="{B61BEF0D-F0BB-DE4B-95CE-6DB70DBA9567}" type="datetimeFigureOut">
-              <a:rPr lang="en-US" dirty="0"/>
-              <a:pPr/>
-              <a:t>6/26/2016</a:t>
+            <a:fld id="{EBD77624-D62F-42AA-91B1-68E8DA9E9D2A}" type="datetime1">
+              <a:rPr lang="en-US" smtClean="0"/>
+              <a:t>6/27/2016</a:t>
             </a:fld>
             <a:endParaRPr lang="en-US" dirty="0"/>
           </a:p>
@@ -7256,7 +7632,7 @@
     </p:spTree>
     <p:extLst>
       <p:ext uri="{BB962C8B-B14F-4D97-AF65-F5344CB8AC3E}">
-        <p14:creationId xmlns="" xmlns:p14="http://schemas.microsoft.com/office/powerpoint/2010/main" val="739815115"/>
+        <p14:creationId xmlns:p14="http://schemas.microsoft.com/office/powerpoint/2010/main" xmlns="" val="739815115"/>
       </p:ext>
     </p:extLst>
   </p:cSld>
@@ -7321,10 +7697,9 @@
           <a:bodyPr/>
           <a:lstStyle/>
           <a:p>
-            <a:fld id="{B61BEF0D-F0BB-DE4B-95CE-6DB70DBA9567}" type="datetimeFigureOut">
-              <a:rPr lang="en-US" dirty="0"/>
-              <a:pPr/>
-              <a:t>6/26/2016</a:t>
+            <a:fld id="{D1634E66-7761-4917-BC86-535D01E1D61A}" type="datetime1">
+              <a:rPr lang="en-US" smtClean="0"/>
+              <a:t>6/27/2016</a:t>
             </a:fld>
             <a:endParaRPr lang="en-US" dirty="0"/>
           </a:p>
@@ -7376,7 +7751,7 @@
     </p:spTree>
     <p:extLst>
       <p:ext uri="{BB962C8B-B14F-4D97-AF65-F5344CB8AC3E}">
-        <p14:creationId xmlns="" xmlns:p14="http://schemas.microsoft.com/office/powerpoint/2010/main" val="2093961521"/>
+        <p14:creationId xmlns:p14="http://schemas.microsoft.com/office/powerpoint/2010/main" xmlns="" val="2093961521"/>
       </p:ext>
     </p:extLst>
   </p:cSld>
@@ -7418,10 +7793,9 @@
           <a:bodyPr/>
           <a:lstStyle/>
           <a:p>
-            <a:fld id="{B61BEF0D-F0BB-DE4B-95CE-6DB70DBA9567}" type="datetimeFigureOut">
-              <a:rPr lang="en-US" dirty="0"/>
-              <a:pPr/>
-              <a:t>6/26/2016</a:t>
+            <a:fld id="{0087ADB7-6436-4DFB-A2C0-2F59907AE06C}" type="datetime1">
+              <a:rPr lang="en-US" smtClean="0"/>
+              <a:t>6/27/2016</a:t>
             </a:fld>
             <a:endParaRPr lang="en-US" dirty="0"/>
           </a:p>
@@ -7473,7 +7847,7 @@
     </p:spTree>
     <p:extLst>
       <p:ext uri="{BB962C8B-B14F-4D97-AF65-F5344CB8AC3E}">
-        <p14:creationId xmlns="" xmlns:p14="http://schemas.microsoft.com/office/powerpoint/2010/main" val="2374404198"/>
+        <p14:creationId xmlns:p14="http://schemas.microsoft.com/office/powerpoint/2010/main" xmlns="" val="2374404198"/>
       </p:ext>
     </p:extLst>
   </p:cSld>
@@ -7703,10 +8077,9 @@
           <a:bodyPr/>
           <a:lstStyle/>
           <a:p>
-            <a:fld id="{B61BEF0D-F0BB-DE4B-95CE-6DB70DBA9567}" type="datetimeFigureOut">
-              <a:rPr lang="en-US" dirty="0"/>
-              <a:pPr/>
-              <a:t>6/26/2016</a:t>
+            <a:fld id="{731CE7BE-2882-4F38-A666-922FC555F090}" type="datetime1">
+              <a:rPr lang="en-US" smtClean="0"/>
+              <a:t>6/27/2016</a:t>
             </a:fld>
             <a:endParaRPr lang="en-US" dirty="0"/>
           </a:p>
@@ -7758,7 +8131,7 @@
     </p:spTree>
     <p:extLst>
       <p:ext uri="{BB962C8B-B14F-4D97-AF65-F5344CB8AC3E}">
-        <p14:creationId xmlns="" xmlns:p14="http://schemas.microsoft.com/office/powerpoint/2010/main" val="3804332489"/>
+        <p14:creationId xmlns:p14="http://schemas.microsoft.com/office/powerpoint/2010/main" xmlns="" val="3804332489"/>
       </p:ext>
     </p:extLst>
   </p:cSld>
@@ -7996,10 +8369,9 @@
           <a:bodyPr/>
           <a:lstStyle/>
           <a:p>
-            <a:fld id="{B61BEF0D-F0BB-DE4B-95CE-6DB70DBA9567}" type="datetimeFigureOut">
-              <a:rPr lang="en-US" dirty="0"/>
-              <a:pPr/>
-              <a:t>6/26/2016</a:t>
+            <a:fld id="{F32E4B10-A2E6-4AB4-BD1D-E2B796E9FF17}" type="datetime1">
+              <a:rPr lang="en-US" smtClean="0"/>
+              <a:t>6/27/2016</a:t>
             </a:fld>
             <a:endParaRPr lang="en-US" dirty="0"/>
           </a:p>
@@ -8051,7 +8423,7 @@
     </p:spTree>
     <p:extLst>
       <p:ext uri="{BB962C8B-B14F-4D97-AF65-F5344CB8AC3E}">
-        <p14:creationId xmlns="" xmlns:p14="http://schemas.microsoft.com/office/powerpoint/2010/main" val="3225960441"/>
+        <p14:creationId xmlns:p14="http://schemas.microsoft.com/office/powerpoint/2010/main" xmlns="" val="3225960441"/>
       </p:ext>
     </p:extLst>
   </p:cSld>
@@ -8528,10 +8900,9 @@
             </a:lvl1pPr>
           </a:lstStyle>
           <a:p>
-            <a:fld id="{B61BEF0D-F0BB-DE4B-95CE-6DB70DBA9567}" type="datetimeFigureOut">
-              <a:rPr lang="en-US" dirty="0"/>
-              <a:pPr/>
-              <a:t>6/26/2016</a:t>
+            <a:fld id="{F73A0F36-C590-4D5C-BF74-34FDAC0C9DDC}" type="datetime1">
+              <a:rPr lang="en-US" smtClean="0"/>
+              <a:t>6/27/2016</a:t>
             </a:fld>
             <a:endParaRPr lang="en-US" dirty="0"/>
           </a:p>
@@ -8619,7 +8990,7 @@
     </p:spTree>
     <p:extLst>
       <p:ext uri="{BB962C8B-B14F-4D97-AF65-F5344CB8AC3E}">
-        <p14:creationId xmlns="" xmlns:p14="http://schemas.microsoft.com/office/powerpoint/2010/main" val="485019011"/>
+        <p14:creationId xmlns:p14="http://schemas.microsoft.com/office/powerpoint/2010/main" xmlns="" val="485019011"/>
       </p:ext>
     </p:extLst>
   </p:cSld>
@@ -8643,6 +9014,7 @@
     <p:sldLayoutId id="2147483702" r:id="rId16"/>
     <p:sldLayoutId id="2147483703" r:id="rId17"/>
   </p:sldLayoutIdLst>
+  <p:hf hdr="0" ftr="0" dt="0"/>
   <p:txStyles>
     <p:titleStyle>
       <a:lvl1pPr algn="ctr" defTabSz="457200" rtl="0" eaLnBrk="1" latinLnBrk="0" hangingPunct="1">
@@ -9362,7 +9734,7 @@
     </p:spTree>
     <p:extLst>
       <p:ext uri="{BB962C8B-B14F-4D97-AF65-F5344CB8AC3E}">
-        <p14:creationId xmlns="" xmlns:p14="http://schemas.microsoft.com/office/powerpoint/2010/main" val="1642343887"/>
+        <p14:creationId xmlns:p14="http://schemas.microsoft.com/office/powerpoint/2010/main" xmlns="" val="1642343887"/>
       </p:ext>
     </p:extLst>
   </p:cSld>
@@ -9453,6 +9825,30 @@
           </a:p>
         </p:txBody>
       </p:sp>
+      <p:sp>
+        <p:nvSpPr>
+          <p:cNvPr id="5" name="Slide Number Placeholder 4"/>
+          <p:cNvSpPr>
+            <a:spLocks noGrp="1"/>
+          </p:cNvSpPr>
+          <p:nvPr>
+            <p:ph type="sldNum" sz="quarter" idx="12"/>
+          </p:nvPr>
+        </p:nvSpPr>
+        <p:spPr/>
+        <p:txBody>
+          <a:bodyPr/>
+          <a:lstStyle/>
+          <a:p>
+            <a:fld id="{D57F1E4F-1CFF-5643-939E-217C01CDF565}" type="slidenum">
+              <a:rPr lang="en-US" smtClean="0"/>
+              <a:pPr/>
+              <a:t>10</a:t>
+            </a:fld>
+            <a:endParaRPr lang="en-US" dirty="0"/>
+          </a:p>
+        </p:txBody>
+      </p:sp>
     </p:spTree>
   </p:cSld>
   <p:clrMapOvr>
@@ -9536,6 +9932,30 @@
           </a:p>
         </p:txBody>
       </p:sp>
+      <p:sp>
+        <p:nvSpPr>
+          <p:cNvPr id="5" name="Slide Number Placeholder 4"/>
+          <p:cNvSpPr>
+            <a:spLocks noGrp="1"/>
+          </p:cNvSpPr>
+          <p:nvPr>
+            <p:ph type="sldNum" sz="quarter" idx="12"/>
+          </p:nvPr>
+        </p:nvSpPr>
+        <p:spPr/>
+        <p:txBody>
+          <a:bodyPr/>
+          <a:lstStyle/>
+          <a:p>
+            <a:fld id="{D57F1E4F-1CFF-5643-939E-217C01CDF565}" type="slidenum">
+              <a:rPr lang="en-US" smtClean="0"/>
+              <a:pPr/>
+              <a:t>11</a:t>
+            </a:fld>
+            <a:endParaRPr lang="en-US" dirty="0"/>
+          </a:p>
+        </p:txBody>
+      </p:sp>
     </p:spTree>
   </p:cSld>
   <p:clrMapOvr>
@@ -9647,6 +10067,30 @@
           </a:p>
         </p:txBody>
       </p:sp>
+      <p:sp>
+        <p:nvSpPr>
+          <p:cNvPr id="6" name="Slide Number Placeholder 5"/>
+          <p:cNvSpPr>
+            <a:spLocks noGrp="1"/>
+          </p:cNvSpPr>
+          <p:nvPr>
+            <p:ph type="sldNum" sz="quarter" idx="12"/>
+          </p:nvPr>
+        </p:nvSpPr>
+        <p:spPr/>
+        <p:txBody>
+          <a:bodyPr/>
+          <a:lstStyle/>
+          <a:p>
+            <a:fld id="{D57F1E4F-1CFF-5643-939E-217C01CDF565}" type="slidenum">
+              <a:rPr lang="en-US" smtClean="0"/>
+              <a:pPr/>
+              <a:t>12</a:t>
+            </a:fld>
+            <a:endParaRPr lang="en-US" dirty="0"/>
+          </a:p>
+        </p:txBody>
+      </p:sp>
     </p:spTree>
   </p:cSld>
   <p:clrMapOvr>
@@ -9703,15 +10147,7 @@
             </a:br>
             <a:r>
               <a:rPr lang="ro-RO" sz="3600" dirty="0" smtClean="0"/>
-              <a:t> Sistem </a:t>
-            </a:r>
-            <a:r>
-              <a:rPr lang="ro-RO" sz="3600" dirty="0" smtClean="0"/>
-              <a:t>global de </a:t>
-            </a:r>
-            <a:r>
-              <a:rPr lang="ro-RO" sz="3600" dirty="0" smtClean="0"/>
-              <a:t>coordonate</a:t>
+              <a:t> Sistem global de coordonate</a:t>
             </a:r>
             <a:endParaRPr lang="en-GB" sz="3600" dirty="0"/>
           </a:p>
@@ -9767,6 +10203,30 @@
               <a:t>Există, totuși, și un sistem de coordonate global, prezentat alături</a:t>
             </a:r>
             <a:endParaRPr lang="en-GB" sz="2400" dirty="0" smtClean="0"/>
+          </a:p>
+        </p:txBody>
+      </p:sp>
+      <p:sp>
+        <p:nvSpPr>
+          <p:cNvPr id="6" name="Slide Number Placeholder 5"/>
+          <p:cNvSpPr>
+            <a:spLocks noGrp="1"/>
+          </p:cNvSpPr>
+          <p:nvPr>
+            <p:ph type="sldNum" sz="quarter" idx="12"/>
+          </p:nvPr>
+        </p:nvSpPr>
+        <p:spPr/>
+        <p:txBody>
+          <a:bodyPr/>
+          <a:lstStyle/>
+          <a:p>
+            <a:fld id="{D57F1E4F-1CFF-5643-939E-217C01CDF565}" type="slidenum">
+              <a:rPr lang="en-US" smtClean="0"/>
+              <a:pPr/>
+              <a:t>13</a:t>
+            </a:fld>
+            <a:endParaRPr lang="en-US" dirty="0"/>
           </a:p>
         </p:txBody>
       </p:sp>
@@ -9854,11 +10314,16 @@
             </a:pPr>
             <a:r>
               <a:rPr lang="ro-RO" dirty="0" smtClean="0"/>
-              <a:t>	</a:t>
-            </a:r>
+              <a:t>	-	detectarea pașilor, </a:t>
+            </a:r>
+          </a:p>
+          <a:p>
+            <a:pPr>
+              <a:buNone/>
+            </a:pPr>
             <a:r>
               <a:rPr lang="ro-RO" dirty="0" smtClean="0"/>
-              <a:t>-	detectarea pașilor, </a:t>
+              <a:t>	- estimarea distanței parcurse la fiecare pas și prin </a:t>
             </a:r>
           </a:p>
           <a:p>
@@ -9867,24 +10332,7 @@
             </a:pPr>
             <a:r>
               <a:rPr lang="ro-RO" dirty="0" smtClean="0"/>
-              <a:t>	</a:t>
-            </a:r>
-            <a:r>
-              <a:rPr lang="ro-RO" dirty="0" smtClean="0"/>
-              <a:t>- estimarea distanței parcurse la fiecare pas și prin </a:t>
-            </a:r>
-          </a:p>
-          <a:p>
-            <a:pPr>
-              <a:buNone/>
-            </a:pPr>
-            <a:r>
-              <a:rPr lang="ro-RO" dirty="0" smtClean="0"/>
-              <a:t>	</a:t>
-            </a:r>
-            <a:r>
-              <a:rPr lang="ro-RO" dirty="0" smtClean="0"/>
-              <a:t>- calcularea deviației față de Nordul Magnetic</a:t>
+              <a:t>	- calcularea deviației față de Nordul Magnetic</a:t>
             </a:r>
           </a:p>
           <a:p>
@@ -9942,6 +10390,30 @@
           </a:prstGeom>
         </p:spPr>
       </p:pic>
+      <p:sp>
+        <p:nvSpPr>
+          <p:cNvPr id="8" name="Slide Number Placeholder 7"/>
+          <p:cNvSpPr>
+            <a:spLocks noGrp="1"/>
+          </p:cNvSpPr>
+          <p:nvPr>
+            <p:ph type="sldNum" sz="quarter" idx="12"/>
+          </p:nvPr>
+        </p:nvSpPr>
+        <p:spPr/>
+        <p:txBody>
+          <a:bodyPr/>
+          <a:lstStyle/>
+          <a:p>
+            <a:fld id="{D57F1E4F-1CFF-5643-939E-217C01CDF565}" type="slidenum">
+              <a:rPr lang="en-US" smtClean="0"/>
+              <a:pPr/>
+              <a:t>14</a:t>
+            </a:fld>
+            <a:endParaRPr lang="en-US" dirty="0"/>
+          </a:p>
+        </p:txBody>
+      </p:sp>
     </p:spTree>
   </p:cSld>
   <p:clrMapOvr>
@@ -10038,6 +10510,30 @@
           </a:p>
         </p:txBody>
       </p:sp>
+      <p:sp>
+        <p:nvSpPr>
+          <p:cNvPr id="7" name="Slide Number Placeholder 6"/>
+          <p:cNvSpPr>
+            <a:spLocks noGrp="1"/>
+          </p:cNvSpPr>
+          <p:nvPr>
+            <p:ph type="sldNum" sz="quarter" idx="12"/>
+          </p:nvPr>
+        </p:nvSpPr>
+        <p:spPr/>
+        <p:txBody>
+          <a:bodyPr/>
+          <a:lstStyle/>
+          <a:p>
+            <a:fld id="{D57F1E4F-1CFF-5643-939E-217C01CDF565}" type="slidenum">
+              <a:rPr lang="en-US" smtClean="0"/>
+              <a:pPr/>
+              <a:t>15</a:t>
+            </a:fld>
+            <a:endParaRPr lang="en-US" dirty="0"/>
+          </a:p>
+        </p:txBody>
+      </p:sp>
     </p:spTree>
   </p:cSld>
   <p:clrMapOvr>
@@ -10116,6 +10612,30 @@
           </a:p>
         </p:txBody>
       </p:sp>
+      <p:sp>
+        <p:nvSpPr>
+          <p:cNvPr id="7" name="Slide Number Placeholder 6"/>
+          <p:cNvSpPr>
+            <a:spLocks noGrp="1"/>
+          </p:cNvSpPr>
+          <p:nvPr>
+            <p:ph type="sldNum" sz="quarter" idx="12"/>
+          </p:nvPr>
+        </p:nvSpPr>
+        <p:spPr/>
+        <p:txBody>
+          <a:bodyPr/>
+          <a:lstStyle/>
+          <a:p>
+            <a:fld id="{D57F1E4F-1CFF-5643-939E-217C01CDF565}" type="slidenum">
+              <a:rPr lang="en-US" smtClean="0"/>
+              <a:pPr/>
+              <a:t>16</a:t>
+            </a:fld>
+            <a:endParaRPr lang="en-US" dirty="0"/>
+          </a:p>
+        </p:txBody>
+      </p:sp>
     </p:spTree>
   </p:cSld>
   <p:clrMapOvr>
@@ -10190,18 +10710,57 @@
           <a:p>
             <a:r>
               <a:rPr lang="ro-RO" dirty="0" smtClean="0"/>
-              <a:t>Pentru estimarea distanței parcurse cu fiecare pas sunt mai multe posibilități, însă pentru implementare s-a ales o soluție despre care se știe că este eficientă în practică, formula lui </a:t>
+              <a:t>Pentru estimarea distanței parcurse cu fiecare pas sunt mai multe posibilități, însă pentru implementare s-a ales o soluție despre care se știe că este eficientă în practică, formula lui Weinberg</a:t>
             </a:r>
             <a:r>
               <a:rPr lang="ro-RO" dirty="0" smtClean="0"/>
-              <a:t>Weinberg:</a:t>
-            </a:r>
-          </a:p>
-          <a:p>
-            <a:r>
-              <a:rPr lang="ro-RO" dirty="0" smtClean="0"/>
-              <a:t>TODO: Adauga formula</a:t>
-            </a:r>
+              <a:t>:</a:t>
+            </a:r>
+            <a:endParaRPr lang="ro-RO" dirty="0" smtClean="0"/>
+          </a:p>
+        </p:txBody>
+      </p:sp>
+      <p:graphicFrame>
+        <p:nvGraphicFramePr>
+          <p:cNvPr id="4" name="Object 3"/>
+          <p:cNvGraphicFramePr>
+            <a:graphicFrameLocks noChangeAspect="1"/>
+          </p:cNvGraphicFramePr>
+          <p:nvPr/>
+        </p:nvGraphicFramePr>
+        <p:xfrm>
+          <a:off x="3168650" y="4856163"/>
+          <a:ext cx="5854700" cy="1516062"/>
+        </p:xfrm>
+        <a:graphic>
+          <a:graphicData uri="http://schemas.openxmlformats.org/presentationml/2006/ole">
+            <p:oleObj spid="_x0000_s1026" name="Equation" r:id="rId4" imgW="863280" imgH="228600" progId="Equation.3">
+              <p:embed/>
+            </p:oleObj>
+          </a:graphicData>
+        </a:graphic>
+      </p:graphicFrame>
+      <p:sp>
+        <p:nvSpPr>
+          <p:cNvPr id="8" name="Slide Number Placeholder 7"/>
+          <p:cNvSpPr>
+            <a:spLocks noGrp="1"/>
+          </p:cNvSpPr>
+          <p:nvPr>
+            <p:ph type="sldNum" sz="quarter" idx="12"/>
+          </p:nvPr>
+        </p:nvSpPr>
+        <p:spPr/>
+        <p:txBody>
+          <a:bodyPr/>
+          <a:lstStyle/>
+          <a:p>
+            <a:fld id="{D57F1E4F-1CFF-5643-939E-217C01CDF565}" type="slidenum">
+              <a:rPr lang="en-US" smtClean="0"/>
+              <a:pPr/>
+              <a:t>17</a:t>
+            </a:fld>
+            <a:endParaRPr lang="en-US" dirty="0"/>
           </a:p>
         </p:txBody>
       </p:sp>
@@ -10293,6 +10852,30 @@
           </a:p>
         </p:txBody>
       </p:sp>
+      <p:sp>
+        <p:nvSpPr>
+          <p:cNvPr id="7" name="Slide Number Placeholder 6"/>
+          <p:cNvSpPr>
+            <a:spLocks noGrp="1"/>
+          </p:cNvSpPr>
+          <p:nvPr>
+            <p:ph type="sldNum" sz="quarter" idx="12"/>
+          </p:nvPr>
+        </p:nvSpPr>
+        <p:spPr/>
+        <p:txBody>
+          <a:bodyPr/>
+          <a:lstStyle/>
+          <a:p>
+            <a:fld id="{D57F1E4F-1CFF-5643-939E-217C01CDF565}" type="slidenum">
+              <a:rPr lang="en-US" smtClean="0"/>
+              <a:pPr/>
+              <a:t>18</a:t>
+            </a:fld>
+            <a:endParaRPr lang="en-US" dirty="0"/>
+          </a:p>
+        </p:txBody>
+      </p:sp>
     </p:spTree>
   </p:cSld>
   <p:clrMapOvr>
@@ -10421,6 +11004,30 @@
           </a:p>
         </p:txBody>
       </p:sp>
+      <p:sp>
+        <p:nvSpPr>
+          <p:cNvPr id="9" name="Slide Number Placeholder 8"/>
+          <p:cNvSpPr>
+            <a:spLocks noGrp="1"/>
+          </p:cNvSpPr>
+          <p:nvPr>
+            <p:ph type="sldNum" sz="quarter" idx="12"/>
+          </p:nvPr>
+        </p:nvSpPr>
+        <p:spPr/>
+        <p:txBody>
+          <a:bodyPr/>
+          <a:lstStyle/>
+          <a:p>
+            <a:fld id="{D57F1E4F-1CFF-5643-939E-217C01CDF565}" type="slidenum">
+              <a:rPr lang="en-US" smtClean="0"/>
+              <a:pPr/>
+              <a:t>19</a:t>
+            </a:fld>
+            <a:endParaRPr lang="en-US" dirty="0"/>
+          </a:p>
+        </p:txBody>
+      </p:sp>
     </p:spTree>
   </p:cSld>
   <p:clrMapOvr>
@@ -10486,9 +11093,37 @@
           <a:p>
             <a:r>
               <a:rPr lang="ro-RO" dirty="0" smtClean="0"/>
-              <a:t>TODO: De adaugat cuprinsul si numere pentru slide-uri</a:t>
+              <a:t>TODO: De adaugat </a:t>
+            </a:r>
+            <a:r>
+              <a:rPr lang="ro-RO" dirty="0" smtClean="0"/>
+              <a:t>cuprinsul</a:t>
             </a:r>
             <a:endParaRPr lang="en-GB" dirty="0"/>
+          </a:p>
+        </p:txBody>
+      </p:sp>
+      <p:sp>
+        <p:nvSpPr>
+          <p:cNvPr id="4" name="Slide Number Placeholder 3"/>
+          <p:cNvSpPr>
+            <a:spLocks noGrp="1"/>
+          </p:cNvSpPr>
+          <p:nvPr>
+            <p:ph type="sldNum" sz="quarter" idx="12"/>
+          </p:nvPr>
+        </p:nvSpPr>
+        <p:spPr/>
+        <p:txBody>
+          <a:bodyPr/>
+          <a:lstStyle/>
+          <a:p>
+            <a:fld id="{D57F1E4F-1CFF-5643-939E-217C01CDF565}" type="slidenum">
+              <a:rPr lang="en-US" smtClean="0"/>
+              <a:pPr/>
+              <a:t>2</a:t>
+            </a:fld>
+            <a:endParaRPr lang="en-US" dirty="0"/>
           </a:p>
         </p:txBody>
       </p:sp>
@@ -10595,6 +11230,30 @@
           </a:p>
         </p:txBody>
       </p:sp>
+      <p:sp>
+        <p:nvSpPr>
+          <p:cNvPr id="5" name="Slide Number Placeholder 4"/>
+          <p:cNvSpPr>
+            <a:spLocks noGrp="1"/>
+          </p:cNvSpPr>
+          <p:nvPr>
+            <p:ph type="sldNum" sz="quarter" idx="12"/>
+          </p:nvPr>
+        </p:nvSpPr>
+        <p:spPr/>
+        <p:txBody>
+          <a:bodyPr/>
+          <a:lstStyle/>
+          <a:p>
+            <a:fld id="{D57F1E4F-1CFF-5643-939E-217C01CDF565}" type="slidenum">
+              <a:rPr lang="en-US" smtClean="0"/>
+              <a:pPr/>
+              <a:t>20</a:t>
+            </a:fld>
+            <a:endParaRPr lang="en-US" dirty="0"/>
+          </a:p>
+        </p:txBody>
+      </p:sp>
     </p:spTree>
   </p:cSld>
   <p:clrMapOvr>
@@ -10630,7 +11289,12 @@
             <p:ph type="title"/>
           </p:nvPr>
         </p:nvSpPr>
-        <p:spPr/>
+        <p:spPr>
+          <a:xfrm>
+            <a:off x="1484311" y="222337"/>
+            <a:ext cx="10018713" cy="1568885"/>
+          </a:xfrm>
+        </p:spPr>
         <p:txBody>
           <a:bodyPr/>
           <a:lstStyle/>
@@ -10650,26 +11314,212 @@
           </a:p>
         </p:txBody>
       </p:sp>
-      <p:sp>
-        <p:nvSpPr>
-          <p:cNvPr id="3" name="Content Placeholder 2"/>
-          <p:cNvSpPr>
-            <a:spLocks noGrp="1"/>
-          </p:cNvSpPr>
+      <p:pic>
+        <p:nvPicPr>
+          <p:cNvPr id="4" name="Content Placeholder 3" descr="LinearRoute.gif"/>
+          <p:cNvPicPr>
+            <a:picLocks noGrp="1" noChangeAspect="1"/>
+          </p:cNvPicPr>
           <p:nvPr>
             <p:ph idx="1"/>
           </p:nvPr>
+        </p:nvPicPr>
+        <p:blipFill>
+          <a:blip r:embed="rId3"/>
+          <a:stretch>
+            <a:fillRect/>
+          </a:stretch>
+        </p:blipFill>
+        <p:spPr>
+          <a:xfrm>
+            <a:off x="1684729" y="2480092"/>
+            <a:ext cx="4591050" cy="3460590"/>
+          </a:xfrm>
+        </p:spPr>
+      </p:pic>
+      <p:pic>
+        <p:nvPicPr>
+          <p:cNvPr id="5" name="Content Placeholder 3" descr="LinearRoute.gif"/>
+          <p:cNvPicPr>
+            <a:picLocks noChangeAspect="1"/>
+          </p:cNvPicPr>
+          <p:nvPr/>
+        </p:nvPicPr>
+        <p:blipFill>
+          <a:blip r:embed="rId4"/>
+          <a:stretch>
+            <a:fillRect/>
+          </a:stretch>
+        </p:blipFill>
+        <p:spPr>
+          <a:xfrm>
+            <a:off x="6471759" y="2480092"/>
+            <a:ext cx="4591049" cy="3460590"/>
+          </a:xfrm>
+          <a:prstGeom prst="rect">
+            <a:avLst/>
+          </a:prstGeom>
+        </p:spPr>
+      </p:pic>
+      <p:sp>
+        <p:nvSpPr>
+          <p:cNvPr id="6" name="Content Placeholder 2"/>
+          <p:cNvSpPr txBox="1">
+            <a:spLocks/>
+          </p:cNvSpPr>
+          <p:nvPr/>
+        </p:nvSpPr>
+        <p:spPr>
+          <a:xfrm>
+            <a:off x="1484311" y="1954060"/>
+            <a:ext cx="4941542" cy="589767"/>
+          </a:xfrm>
+          <a:prstGeom prst="rect">
+            <a:avLst/>
+          </a:prstGeom>
+        </p:spPr>
+        <p:txBody>
+          <a:bodyPr vert="horz" lIns="91440" tIns="45720" rIns="91440" bIns="45720" rtlCol="0" anchor="ctr">
+            <a:normAutofit/>
+          </a:bodyPr>
+          <a:lstStyle/>
+          <a:p>
+            <a:pPr marL="285750" marR="0" lvl="0" indent="-285750" algn="l" defTabSz="457200" rtl="0" eaLnBrk="1" fontAlgn="auto" latinLnBrk="0" hangingPunct="1">
+              <a:lnSpc>
+                <a:spcPct val="100000"/>
+              </a:lnSpc>
+              <a:spcBef>
+                <a:spcPct val="20000"/>
+              </a:spcBef>
+              <a:spcAft>
+                <a:spcPts val="600"/>
+              </a:spcAft>
+              <a:buClr>
+                <a:schemeClr val="accent1">
+                  <a:lumMod val="75000"/>
+                </a:schemeClr>
+              </a:buClr>
+              <a:buSzPct val="145000"/>
+              <a:buFont typeface="Arial"/>
+              <a:buChar char="•"/>
+              <a:tabLst/>
+              <a:defRPr/>
+            </a:pPr>
+            <a:r>
+              <a:rPr lang="en-GB" sz="2400" dirty="0" smtClean="0"/>
+              <a:t>Cale liniar</a:t>
+            </a:r>
+            <a:r>
+              <a:rPr lang="ro-RO" sz="2400" dirty="0" smtClean="0"/>
+              <a:t>ă</a:t>
+            </a:r>
+            <a:endParaRPr kumimoji="0" lang="en-GB" sz="2400" b="0" i="0" u="none" strike="noStrike" kern="1200" cap="none" spc="0" normalizeH="0" baseline="0" noProof="0" dirty="0">
+              <a:ln>
+                <a:noFill/>
+              </a:ln>
+              <a:solidFill>
+                <a:schemeClr val="tx1"/>
+              </a:solidFill>
+              <a:effectLst/>
+              <a:uLnTx/>
+              <a:uFillTx/>
+              <a:latin typeface="+mn-lt"/>
+              <a:ea typeface="+mn-ea"/>
+              <a:cs typeface="+mn-cs"/>
+            </a:endParaRPr>
+          </a:p>
+        </p:txBody>
+      </p:sp>
+      <p:sp>
+        <p:nvSpPr>
+          <p:cNvPr id="7" name="Content Placeholder 2"/>
+          <p:cNvSpPr txBox="1">
+            <a:spLocks/>
+          </p:cNvSpPr>
+          <p:nvPr/>
+        </p:nvSpPr>
+        <p:spPr>
+          <a:xfrm>
+            <a:off x="6384075" y="1954060"/>
+            <a:ext cx="4941542" cy="589767"/>
+          </a:xfrm>
+          <a:prstGeom prst="rect">
+            <a:avLst/>
+          </a:prstGeom>
+        </p:spPr>
+        <p:txBody>
+          <a:bodyPr vert="horz" lIns="91440" tIns="45720" rIns="91440" bIns="45720" rtlCol="0" anchor="ctr">
+            <a:normAutofit/>
+          </a:bodyPr>
+          <a:lstStyle/>
+          <a:p>
+            <a:pPr marL="285750" marR="0" lvl="0" indent="-285750" algn="l" defTabSz="457200" rtl="0" eaLnBrk="1" fontAlgn="auto" latinLnBrk="0" hangingPunct="1">
+              <a:lnSpc>
+                <a:spcPct val="100000"/>
+              </a:lnSpc>
+              <a:spcBef>
+                <a:spcPct val="20000"/>
+              </a:spcBef>
+              <a:spcAft>
+                <a:spcPts val="600"/>
+              </a:spcAft>
+              <a:buClr>
+                <a:schemeClr val="accent1">
+                  <a:lumMod val="75000"/>
+                </a:schemeClr>
+              </a:buClr>
+              <a:buSzPct val="145000"/>
+              <a:buFont typeface="Arial"/>
+              <a:buChar char="•"/>
+              <a:tabLst/>
+              <a:defRPr/>
+            </a:pPr>
+            <a:r>
+              <a:rPr lang="en-GB" sz="2400" dirty="0" smtClean="0"/>
+              <a:t>Cale </a:t>
+            </a:r>
+            <a:r>
+              <a:rPr lang="ro-RO" sz="2400" dirty="0" smtClean="0"/>
+              <a:t>rectangulară</a:t>
+            </a:r>
+            <a:endParaRPr kumimoji="0" lang="en-GB" sz="2400" b="0" i="0" u="none" strike="noStrike" kern="1200" cap="none" spc="0" normalizeH="0" baseline="0" noProof="0" dirty="0">
+              <a:ln>
+                <a:noFill/>
+              </a:ln>
+              <a:solidFill>
+                <a:schemeClr val="tx1"/>
+              </a:solidFill>
+              <a:effectLst/>
+              <a:uLnTx/>
+              <a:uFillTx/>
+              <a:latin typeface="+mn-lt"/>
+              <a:ea typeface="+mn-ea"/>
+              <a:cs typeface="+mn-cs"/>
+            </a:endParaRPr>
+          </a:p>
+        </p:txBody>
+      </p:sp>
+      <p:sp>
+        <p:nvSpPr>
+          <p:cNvPr id="9" name="Slide Number Placeholder 8"/>
+          <p:cNvSpPr>
+            <a:spLocks noGrp="1"/>
+          </p:cNvSpPr>
+          <p:nvPr>
+            <p:ph type="sldNum" sz="quarter" idx="12"/>
+          </p:nvPr>
         </p:nvSpPr>
         <p:spPr/>
         <p:txBody>
           <a:bodyPr/>
           <a:lstStyle/>
           <a:p>
-            <a:r>
-              <a:rPr lang="ro-RO" dirty="0" smtClean="0"/>
-              <a:t>TODO: GIF cu parcursul in linie dreapta (eventual poate fi alaturat si cel dreptunghiular, daca incap pe aceleasi slide)</a:t>
-            </a:r>
-            <a:endParaRPr lang="en-GB" dirty="0"/>
+            <a:fld id="{D57F1E4F-1CFF-5643-939E-217C01CDF565}" type="slidenum">
+              <a:rPr lang="en-US" smtClean="0"/>
+              <a:pPr/>
+              <a:t>21</a:t>
+            </a:fld>
+            <a:endParaRPr lang="en-US" dirty="0"/>
           </a:p>
         </p:txBody>
       </p:sp>
@@ -10678,6 +11528,13 @@
   <p:clrMapOvr>
     <a:masterClrMapping/>
   </p:clrMapOvr>
+  <p:timing>
+    <p:tnLst>
+      <p:par>
+        <p:cTn id="1" dur="indefinite" restart="never" nodeType="tmRoot"/>
+      </p:par>
+    </p:tnLst>
+  </p:timing>
 </p:sld>
 </file>
 
@@ -10763,11 +11620,42 @@
           </a:p>
         </p:txBody>
       </p:sp>
+      <p:sp>
+        <p:nvSpPr>
+          <p:cNvPr id="5" name="Slide Number Placeholder 4"/>
+          <p:cNvSpPr>
+            <a:spLocks noGrp="1"/>
+          </p:cNvSpPr>
+          <p:nvPr>
+            <p:ph type="sldNum" sz="quarter" idx="12"/>
+          </p:nvPr>
+        </p:nvSpPr>
+        <p:spPr/>
+        <p:txBody>
+          <a:bodyPr/>
+          <a:lstStyle/>
+          <a:p>
+            <a:fld id="{D57F1E4F-1CFF-5643-939E-217C01CDF565}" type="slidenum">
+              <a:rPr lang="en-US" smtClean="0"/>
+              <a:pPr/>
+              <a:t>22</a:t>
+            </a:fld>
+            <a:endParaRPr lang="en-US" dirty="0"/>
+          </a:p>
+        </p:txBody>
+      </p:sp>
     </p:spTree>
   </p:cSld>
   <p:clrMapOvr>
     <a:masterClrMapping/>
   </p:clrMapOvr>
+  <p:timing>
+    <p:tnLst>
+      <p:par>
+        <p:cTn id="1" dur="indefinite" restart="never" nodeType="tmRoot"/>
+      </p:par>
+    </p:tnLst>
+  </p:timing>
 </p:sld>
 </file>
 
@@ -10846,11 +11734,42 @@
           </a:p>
         </p:txBody>
       </p:sp>
+      <p:sp>
+        <p:nvSpPr>
+          <p:cNvPr id="5" name="Slide Number Placeholder 4"/>
+          <p:cNvSpPr>
+            <a:spLocks noGrp="1"/>
+          </p:cNvSpPr>
+          <p:nvPr>
+            <p:ph type="sldNum" sz="quarter" idx="12"/>
+          </p:nvPr>
+        </p:nvSpPr>
+        <p:spPr/>
+        <p:txBody>
+          <a:bodyPr/>
+          <a:lstStyle/>
+          <a:p>
+            <a:fld id="{D57F1E4F-1CFF-5643-939E-217C01CDF565}" type="slidenum">
+              <a:rPr lang="en-US" smtClean="0"/>
+              <a:pPr/>
+              <a:t>23</a:t>
+            </a:fld>
+            <a:endParaRPr lang="en-US" dirty="0"/>
+          </a:p>
+        </p:txBody>
+      </p:sp>
     </p:spTree>
   </p:cSld>
   <p:clrMapOvr>
     <a:masterClrMapping/>
   </p:clrMapOvr>
+  <p:timing>
+    <p:tnLst>
+      <p:par>
+        <p:cTn id="1" dur="indefinite" restart="never" nodeType="tmRoot"/>
+      </p:par>
+    </p:tnLst>
+  </p:timing>
 </p:sld>
 </file>
 
@@ -10932,6 +11851,30 @@
               <a:t>Totuși, navigația așa cum este ea acum nu este suficient de precisă</a:t>
             </a:r>
             <a:endParaRPr lang="en-GB" dirty="0"/>
+          </a:p>
+        </p:txBody>
+      </p:sp>
+      <p:sp>
+        <p:nvSpPr>
+          <p:cNvPr id="5" name="Slide Number Placeholder 4"/>
+          <p:cNvSpPr>
+            <a:spLocks noGrp="1"/>
+          </p:cNvSpPr>
+          <p:nvPr>
+            <p:ph type="sldNum" sz="quarter" idx="12"/>
+          </p:nvPr>
+        </p:nvSpPr>
+        <p:spPr/>
+        <p:txBody>
+          <a:bodyPr/>
+          <a:lstStyle/>
+          <a:p>
+            <a:fld id="{D57F1E4F-1CFF-5643-939E-217C01CDF565}" type="slidenum">
+              <a:rPr lang="en-US" smtClean="0"/>
+              <a:pPr/>
+              <a:t>3</a:t>
+            </a:fld>
+            <a:endParaRPr lang="en-US" dirty="0"/>
           </a:p>
         </p:txBody>
       </p:sp>
@@ -11056,6 +11999,30 @@
               <a:t>’m Bob!</a:t>
             </a:r>
             <a:endParaRPr lang="en-GB" dirty="0"/>
+          </a:p>
+        </p:txBody>
+      </p:sp>
+      <p:sp>
+        <p:nvSpPr>
+          <p:cNvPr id="7" name="Slide Number Placeholder 6"/>
+          <p:cNvSpPr>
+            <a:spLocks noGrp="1"/>
+          </p:cNvSpPr>
+          <p:nvPr>
+            <p:ph type="sldNum" sz="quarter" idx="12"/>
+          </p:nvPr>
+        </p:nvSpPr>
+        <p:spPr/>
+        <p:txBody>
+          <a:bodyPr/>
+          <a:lstStyle/>
+          <a:p>
+            <a:fld id="{D57F1E4F-1CFF-5643-939E-217C01CDF565}" type="slidenum">
+              <a:rPr lang="en-US" smtClean="0"/>
+              <a:pPr/>
+              <a:t>4</a:t>
+            </a:fld>
+            <a:endParaRPr lang="en-US" dirty="0"/>
           </a:p>
         </p:txBody>
       </p:sp>
@@ -11208,6 +12175,30 @@
               <a:t>’m Alice!</a:t>
             </a:r>
             <a:endParaRPr lang="en-GB" dirty="0"/>
+          </a:p>
+        </p:txBody>
+      </p:sp>
+      <p:sp>
+        <p:nvSpPr>
+          <p:cNvPr id="8" name="Slide Number Placeholder 7"/>
+          <p:cNvSpPr>
+            <a:spLocks noGrp="1"/>
+          </p:cNvSpPr>
+          <p:nvPr>
+            <p:ph type="sldNum" sz="quarter" idx="12"/>
+          </p:nvPr>
+        </p:nvSpPr>
+        <p:spPr/>
+        <p:txBody>
+          <a:bodyPr/>
+          <a:lstStyle/>
+          <a:p>
+            <a:fld id="{D57F1E4F-1CFF-5643-939E-217C01CDF565}" type="slidenum">
+              <a:rPr lang="en-US" smtClean="0"/>
+              <a:pPr/>
+              <a:t>5</a:t>
+            </a:fld>
+            <a:endParaRPr lang="en-US" dirty="0"/>
           </a:p>
         </p:txBody>
       </p:sp>
@@ -11389,6 +12380,30 @@
               <a:t>?</a:t>
             </a:r>
             <a:endParaRPr lang="en-GB" dirty="0"/>
+          </a:p>
+        </p:txBody>
+      </p:sp>
+      <p:sp>
+        <p:nvSpPr>
+          <p:cNvPr id="9" name="Slide Number Placeholder 8"/>
+          <p:cNvSpPr>
+            <a:spLocks noGrp="1"/>
+          </p:cNvSpPr>
+          <p:nvPr>
+            <p:ph type="sldNum" sz="quarter" idx="12"/>
+          </p:nvPr>
+        </p:nvSpPr>
+        <p:spPr/>
+        <p:txBody>
+          <a:bodyPr/>
+          <a:lstStyle/>
+          <a:p>
+            <a:fld id="{D57F1E4F-1CFF-5643-939E-217C01CDF565}" type="slidenum">
+              <a:rPr lang="en-US" smtClean="0"/>
+              <a:pPr/>
+              <a:t>6</a:t>
+            </a:fld>
+            <a:endParaRPr lang="en-US" dirty="0"/>
           </a:p>
         </p:txBody>
       </p:sp>
@@ -11555,6 +12570,30 @@
           </a:prstGeom>
         </p:spPr>
       </p:pic>
+      <p:sp>
+        <p:nvSpPr>
+          <p:cNvPr id="9" name="Slide Number Placeholder 8"/>
+          <p:cNvSpPr>
+            <a:spLocks noGrp="1"/>
+          </p:cNvSpPr>
+          <p:nvPr>
+            <p:ph type="sldNum" sz="quarter" idx="12"/>
+          </p:nvPr>
+        </p:nvSpPr>
+        <p:spPr/>
+        <p:txBody>
+          <a:bodyPr/>
+          <a:lstStyle/>
+          <a:p>
+            <a:fld id="{D57F1E4F-1CFF-5643-939E-217C01CDF565}" type="slidenum">
+              <a:rPr lang="en-US" smtClean="0"/>
+              <a:pPr/>
+              <a:t>7</a:t>
+            </a:fld>
+            <a:endParaRPr lang="en-US" dirty="0"/>
+          </a:p>
+        </p:txBody>
+      </p:sp>
     </p:spTree>
   </p:cSld>
   <p:clrMapOvr>
@@ -11814,6 +12853,30 @@
           </a:prstGeom>
         </p:spPr>
       </p:pic>
+      <p:sp>
+        <p:nvSpPr>
+          <p:cNvPr id="13" name="Slide Number Placeholder 12"/>
+          <p:cNvSpPr>
+            <a:spLocks noGrp="1"/>
+          </p:cNvSpPr>
+          <p:nvPr>
+            <p:ph type="sldNum" sz="quarter" idx="12"/>
+          </p:nvPr>
+        </p:nvSpPr>
+        <p:spPr/>
+        <p:txBody>
+          <a:bodyPr/>
+          <a:lstStyle/>
+          <a:p>
+            <a:fld id="{D57F1E4F-1CFF-5643-939E-217C01CDF565}" type="slidenum">
+              <a:rPr lang="en-US" smtClean="0"/>
+              <a:pPr/>
+              <a:t>8</a:t>
+            </a:fld>
+            <a:endParaRPr lang="en-US" dirty="0"/>
+          </a:p>
+        </p:txBody>
+      </p:sp>
     </p:spTree>
   </p:cSld>
   <p:clrMapOvr>
@@ -11900,7 +12963,30 @@
               <a:rPr lang="ro-RO" dirty="0" smtClean="0"/>
               <a:t>Aceste limitări ale GPS fac necesară căutarea unei soluții alternative care să îmbunătățească sau să ofere navigație</a:t>
             </a:r>
-            <a:endParaRPr lang="ro-RO" dirty="0" smtClean="0"/>
+          </a:p>
+        </p:txBody>
+      </p:sp>
+      <p:sp>
+        <p:nvSpPr>
+          <p:cNvPr id="5" name="Slide Number Placeholder 4"/>
+          <p:cNvSpPr>
+            <a:spLocks noGrp="1"/>
+          </p:cNvSpPr>
+          <p:nvPr>
+            <p:ph type="sldNum" sz="quarter" idx="12"/>
+          </p:nvPr>
+        </p:nvSpPr>
+        <p:spPr/>
+        <p:txBody>
+          <a:bodyPr/>
+          <a:lstStyle/>
+          <a:p>
+            <a:fld id="{D57F1E4F-1CFF-5643-939E-217C01CDF565}" type="slidenum">
+              <a:rPr lang="en-US" smtClean="0"/>
+              <a:pPr/>
+              <a:t>9</a:t>
+            </a:fld>
+            <a:endParaRPr lang="en-US" dirty="0"/>
           </a:p>
         </p:txBody>
       </p:sp>
@@ -12167,7 +13253,7 @@
   <a:extraClrSchemeLst/>
   <a:extLst>
     <a:ext uri="{05A4C25C-085E-4340-85A3-A5531E510DB2}">
-      <thm15:themeFamily xmlns="" xmlns:thm15="http://schemas.microsoft.com/office/thememl/2012/main" name="Parallax" id="{3388167B-A2EB-4685-9635-1831D9AEF8C4}" vid="{4F7A876A-7598-49CA-AFC8-8EDA2551E4A7}"/>
+      <thm15:themeFamily xmlns:thm15="http://schemas.microsoft.com/office/thememl/2012/main" xmlns="" name="Parallax" id="{3388167B-A2EB-4685-9635-1831D9AEF8C4}" vid="{4F7A876A-7598-49CA-AFC8-8EDA2551E4A7}"/>
     </a:ext>
   </a:extLst>
 </a:theme>
@@ -12462,7 +13548,7 @@
   <a:extraClrSchemeLst/>
   <a:extLst>
     <a:ext uri="{05A4C25C-085E-4340-85A3-A5531E510DB2}">
-      <thm15:themeFamily xmlns="" xmlns:thm15="http://schemas.microsoft.com/office/thememl/2012/main" name="Office Theme" id="{62F939B6-93AF-4DB8-9C6B-D6C7DFDC589F}" vid="{4A3C46E8-61CC-4603-A589-7422A47A8E4A}"/>
+      <thm15:themeFamily xmlns:thm15="http://schemas.microsoft.com/office/thememl/2012/main" xmlns="" name="Office Theme" id="{62F939B6-93AF-4DB8-9C6B-D6C7DFDC589F}" vid="{4A3C46E8-61CC-4603-A589-7422A47A8E4A}"/>
     </a:ext>
   </a:extLst>
 </a:theme>

</xml_diff>